<commit_message>
add project documents + add create user end point in the API.
</commit_message>
<xml_diff>
--- a/Final Delivery/documentation/ArchitectureDiagram.pptx
+++ b/Final Delivery/documentation/ArchitectureDiagram.pptx
@@ -197,7 +197,7 @@
           <a:p>
             <a:fld id="{3AB3FB6B-0CA4-1944-BACF-0F8297AEBC9D}" type="datetimeFigureOut">
               <a:rPr lang="en-US" smtClean="0"/>
-              <a:t>12/10/21</a:t>
+              <a:t>12/11/21</a:t>
             </a:fld>
             <a:endParaRPr lang="en-US"/>
           </a:p>
@@ -611,7 +611,7 @@
           <a:p>
             <a:fld id="{0C0AC3C8-E471-B24F-B12D-AA2DE7AA6F8A}" type="datetimeFigureOut">
               <a:rPr lang="en-US" smtClean="0"/>
-              <a:t>12/10/21</a:t>
+              <a:t>12/11/21</a:t>
             </a:fld>
             <a:endParaRPr lang="en-US"/>
           </a:p>
@@ -809,7 +809,7 @@
           <a:p>
             <a:fld id="{0C0AC3C8-E471-B24F-B12D-AA2DE7AA6F8A}" type="datetimeFigureOut">
               <a:rPr lang="en-US" smtClean="0"/>
-              <a:t>12/10/21</a:t>
+              <a:t>12/11/21</a:t>
             </a:fld>
             <a:endParaRPr lang="en-US"/>
           </a:p>
@@ -1017,7 +1017,7 @@
           <a:p>
             <a:fld id="{0C0AC3C8-E471-B24F-B12D-AA2DE7AA6F8A}" type="datetimeFigureOut">
               <a:rPr lang="en-US" smtClean="0"/>
-              <a:t>12/10/21</a:t>
+              <a:t>12/11/21</a:t>
             </a:fld>
             <a:endParaRPr lang="en-US"/>
           </a:p>
@@ -1215,7 +1215,7 @@
           <a:p>
             <a:fld id="{0C0AC3C8-E471-B24F-B12D-AA2DE7AA6F8A}" type="datetimeFigureOut">
               <a:rPr lang="en-US" smtClean="0"/>
-              <a:t>12/10/21</a:t>
+              <a:t>12/11/21</a:t>
             </a:fld>
             <a:endParaRPr lang="en-US"/>
           </a:p>
@@ -1490,7 +1490,7 @@
           <a:p>
             <a:fld id="{0C0AC3C8-E471-B24F-B12D-AA2DE7AA6F8A}" type="datetimeFigureOut">
               <a:rPr lang="en-US" smtClean="0"/>
-              <a:t>12/10/21</a:t>
+              <a:t>12/11/21</a:t>
             </a:fld>
             <a:endParaRPr lang="en-US"/>
           </a:p>
@@ -1755,7 +1755,7 @@
           <a:p>
             <a:fld id="{0C0AC3C8-E471-B24F-B12D-AA2DE7AA6F8A}" type="datetimeFigureOut">
               <a:rPr lang="en-US" smtClean="0"/>
-              <a:t>12/10/21</a:t>
+              <a:t>12/11/21</a:t>
             </a:fld>
             <a:endParaRPr lang="en-US"/>
           </a:p>
@@ -2167,7 +2167,7 @@
           <a:p>
             <a:fld id="{0C0AC3C8-E471-B24F-B12D-AA2DE7AA6F8A}" type="datetimeFigureOut">
               <a:rPr lang="en-US" smtClean="0"/>
-              <a:t>12/10/21</a:t>
+              <a:t>12/11/21</a:t>
             </a:fld>
             <a:endParaRPr lang="en-US"/>
           </a:p>
@@ -2308,7 +2308,7 @@
           <a:p>
             <a:fld id="{0C0AC3C8-E471-B24F-B12D-AA2DE7AA6F8A}" type="datetimeFigureOut">
               <a:rPr lang="en-US" smtClean="0"/>
-              <a:t>12/10/21</a:t>
+              <a:t>12/11/21</a:t>
             </a:fld>
             <a:endParaRPr lang="en-US"/>
           </a:p>
@@ -2421,7 +2421,7 @@
           <a:p>
             <a:fld id="{0C0AC3C8-E471-B24F-B12D-AA2DE7AA6F8A}" type="datetimeFigureOut">
               <a:rPr lang="en-US" smtClean="0"/>
-              <a:t>12/10/21</a:t>
+              <a:t>12/11/21</a:t>
             </a:fld>
             <a:endParaRPr lang="en-US"/>
           </a:p>
@@ -2732,7 +2732,7 @@
           <a:p>
             <a:fld id="{0C0AC3C8-E471-B24F-B12D-AA2DE7AA6F8A}" type="datetimeFigureOut">
               <a:rPr lang="en-US" smtClean="0"/>
-              <a:t>12/10/21</a:t>
+              <a:t>12/11/21</a:t>
             </a:fld>
             <a:endParaRPr lang="en-US"/>
           </a:p>
@@ -3020,7 +3020,7 @@
           <a:p>
             <a:fld id="{0C0AC3C8-E471-B24F-B12D-AA2DE7AA6F8A}" type="datetimeFigureOut">
               <a:rPr lang="en-US" smtClean="0"/>
-              <a:t>12/10/21</a:t>
+              <a:t>12/11/21</a:t>
             </a:fld>
             <a:endParaRPr lang="en-US"/>
           </a:p>
@@ -3261,7 +3261,7 @@
           <a:p>
             <a:fld id="{0C0AC3C8-E471-B24F-B12D-AA2DE7AA6F8A}" type="datetimeFigureOut">
               <a:rPr lang="en-US" smtClean="0"/>
-              <a:t>12/10/21</a:t>
+              <a:t>12/11/21</a:t>
             </a:fld>
             <a:endParaRPr lang="en-US"/>
           </a:p>
@@ -3692,7 +3692,7 @@
         </p:nvSpPr>
         <p:spPr>
           <a:xfrm>
-            <a:off x="5397059" y="1074057"/>
+            <a:off x="4299661" y="1027758"/>
             <a:ext cx="3384331" cy="4452131"/>
           </a:xfrm>
           <a:prstGeom prst="rect">
@@ -3739,7 +3739,7 @@
         </p:nvSpPr>
         <p:spPr>
           <a:xfrm>
-            <a:off x="6613491" y="598092"/>
+            <a:off x="5516093" y="551793"/>
             <a:ext cx="1369588" cy="369332"/>
           </a:xfrm>
           <a:prstGeom prst="rect">
@@ -3774,7 +3774,7 @@
         </p:nvSpPr>
         <p:spPr>
           <a:xfrm>
-            <a:off x="5866252" y="1384114"/>
+            <a:off x="4768854" y="1337815"/>
             <a:ext cx="2535621" cy="1587061"/>
           </a:xfrm>
           <a:prstGeom prst="rect">
@@ -3829,7 +3829,7 @@
         </p:blipFill>
         <p:spPr>
           <a:xfrm>
-            <a:off x="6056751" y="1444121"/>
+            <a:off x="4959353" y="1397822"/>
             <a:ext cx="306239" cy="240862"/>
           </a:xfrm>
           <a:prstGeom prst="rect">
@@ -3851,7 +3851,7 @@
         </p:nvSpPr>
         <p:spPr>
           <a:xfrm>
-            <a:off x="6056751" y="1813565"/>
+            <a:off x="4959353" y="1767266"/>
             <a:ext cx="2103384" cy="978931"/>
           </a:xfrm>
           <a:prstGeom prst="rect">
@@ -3898,8 +3898,8 @@
         </p:nvSpPr>
         <p:spPr>
           <a:xfrm>
-            <a:off x="6504421" y="2105777"/>
-            <a:ext cx="1376857" cy="369332"/>
+            <a:off x="5162435" y="2082689"/>
+            <a:ext cx="1846213" cy="369332"/>
           </a:xfrm>
           <a:prstGeom prst="rect">
             <a:avLst/>
@@ -3914,7 +3914,7 @@
           <a:p>
             <a:r>
               <a:rPr lang="en-US" dirty="0"/>
-              <a:t>Web Server</a:t>
+              <a:t>Web App Server</a:t>
             </a:r>
           </a:p>
         </p:txBody>
@@ -3933,7 +3933,7 @@
         </p:nvSpPr>
         <p:spPr>
           <a:xfrm>
-            <a:off x="6354324" y="1367812"/>
+            <a:off x="5256926" y="1321513"/>
             <a:ext cx="1887923" cy="369332"/>
           </a:xfrm>
           <a:prstGeom prst="rect">
@@ -3983,7 +3983,7 @@
         </p:blipFill>
         <p:spPr bwMode="auto">
           <a:xfrm>
-            <a:off x="570708" y="2577934"/>
+            <a:off x="364908" y="2494551"/>
             <a:ext cx="1004194" cy="1004194"/>
           </a:xfrm>
           <a:prstGeom prst="rect">
@@ -4001,92 +4001,6 @@
           </a:extLst>
         </p:spPr>
       </p:pic>
-      <p:cxnSp>
-        <p:nvCxnSpPr>
-          <p:cNvPr id="12" name="Straight Arrow Connector 11">
-            <a:extLst>
-              <a:ext uri="{FF2B5EF4-FFF2-40B4-BE49-F238E27FC236}">
-                <a16:creationId xmlns:a16="http://schemas.microsoft.com/office/drawing/2014/main" id="{625AB0B1-A2FB-944A-BC29-016F56421C8D}"/>
-              </a:ext>
-            </a:extLst>
-          </p:cNvPr>
-          <p:cNvCxnSpPr>
-            <a:cxnSpLocks/>
-            <a:stCxn id="1026" idx="3"/>
-          </p:cNvCxnSpPr>
-          <p:nvPr/>
-        </p:nvCxnSpPr>
-        <p:spPr>
-          <a:xfrm flipV="1">
-            <a:off x="1574902" y="2475109"/>
-            <a:ext cx="1330801" cy="604922"/>
-          </a:xfrm>
-          <a:prstGeom prst="straightConnector1">
-            <a:avLst/>
-          </a:prstGeom>
-          <a:ln w="28575">
-            <a:headEnd type="triangle" w="med" len="med"/>
-            <a:tailEnd type="triangle" w="med" len="med"/>
-          </a:ln>
-        </p:spPr>
-        <p:style>
-          <a:lnRef idx="1">
-            <a:schemeClr val="accent1"/>
-          </a:lnRef>
-          <a:fillRef idx="0">
-            <a:schemeClr val="accent1"/>
-          </a:fillRef>
-          <a:effectRef idx="0">
-            <a:schemeClr val="accent1"/>
-          </a:effectRef>
-          <a:fontRef idx="minor">
-            <a:schemeClr val="tx1"/>
-          </a:fontRef>
-        </p:style>
-      </p:cxnSp>
-      <p:cxnSp>
-        <p:nvCxnSpPr>
-          <p:cNvPr id="14" name="Straight Arrow Connector 13">
-            <a:extLst>
-              <a:ext uri="{FF2B5EF4-FFF2-40B4-BE49-F238E27FC236}">
-                <a16:creationId xmlns:a16="http://schemas.microsoft.com/office/drawing/2014/main" id="{80FBF001-0885-754E-849C-3414109A3197}"/>
-              </a:ext>
-            </a:extLst>
-          </p:cNvPr>
-          <p:cNvCxnSpPr>
-            <a:cxnSpLocks/>
-            <a:endCxn id="8" idx="1"/>
-          </p:cNvCxnSpPr>
-          <p:nvPr/>
-        </p:nvCxnSpPr>
-        <p:spPr>
-          <a:xfrm>
-            <a:off x="5243512" y="2099352"/>
-            <a:ext cx="813239" cy="203679"/>
-          </a:xfrm>
-          <a:prstGeom prst="straightConnector1">
-            <a:avLst/>
-          </a:prstGeom>
-          <a:ln w="28575">
-            <a:headEnd type="triangle" w="med" len="med"/>
-            <a:tailEnd type="triangle" w="med" len="med"/>
-          </a:ln>
-        </p:spPr>
-        <p:style>
-          <a:lnRef idx="1">
-            <a:schemeClr val="accent1"/>
-          </a:lnRef>
-          <a:fillRef idx="0">
-            <a:schemeClr val="accent1"/>
-          </a:fillRef>
-          <a:effectRef idx="0">
-            <a:schemeClr val="accent1"/>
-          </a:effectRef>
-          <a:fontRef idx="minor">
-            <a:schemeClr val="tx1"/>
-          </a:fontRef>
-        </p:style>
-      </p:cxnSp>
       <p:sp>
         <p:nvSpPr>
           <p:cNvPr id="17" name="TextBox 16">
@@ -4101,7 +4015,7 @@
         </p:nvSpPr>
         <p:spPr>
           <a:xfrm>
-            <a:off x="391103" y="3575338"/>
+            <a:off x="272851" y="2198453"/>
             <a:ext cx="1419028" cy="369332"/>
           </a:xfrm>
           <a:prstGeom prst="rect">
@@ -4122,108 +4036,6 @@
           </a:p>
         </p:txBody>
       </p:sp>
-      <p:pic>
-        <p:nvPicPr>
-          <p:cNvPr id="16" name="Picture 15">
-            <a:extLst>
-              <a:ext uri="{FF2B5EF4-FFF2-40B4-BE49-F238E27FC236}">
-                <a16:creationId xmlns:a16="http://schemas.microsoft.com/office/drawing/2014/main" id="{51EC2F49-2440-5F44-9240-ABEB2152B9FB}"/>
-              </a:ext>
-            </a:extLst>
-          </p:cNvPr>
-          <p:cNvPicPr>
-            <a:picLocks noChangeAspect="1"/>
-          </p:cNvPicPr>
-          <p:nvPr/>
-        </p:nvPicPr>
-        <p:blipFill>
-          <a:blip r:embed="rId4"/>
-          <a:stretch>
-            <a:fillRect/>
-          </a:stretch>
-        </p:blipFill>
-        <p:spPr>
-          <a:xfrm>
-            <a:off x="3029991" y="3871409"/>
-            <a:ext cx="666303" cy="923409"/>
-          </a:xfrm>
-          <a:prstGeom prst="rect">
-            <a:avLst/>
-          </a:prstGeom>
-        </p:spPr>
-      </p:pic>
-      <p:pic>
-        <p:nvPicPr>
-          <p:cNvPr id="18" name="Picture 17">
-            <a:extLst>
-              <a:ext uri="{FF2B5EF4-FFF2-40B4-BE49-F238E27FC236}">
-                <a16:creationId xmlns:a16="http://schemas.microsoft.com/office/drawing/2014/main" id="{2A1E8CF8-2C5A-1648-B580-68E1B6088245}"/>
-              </a:ext>
-            </a:extLst>
-          </p:cNvPr>
-          <p:cNvPicPr>
-            <a:picLocks noChangeAspect="1"/>
-          </p:cNvPicPr>
-          <p:nvPr/>
-        </p:nvPicPr>
-        <p:blipFill>
-          <a:blip r:embed="rId5"/>
-          <a:stretch>
-            <a:fillRect/>
-          </a:stretch>
-        </p:blipFill>
-        <p:spPr>
-          <a:xfrm>
-            <a:off x="2905703" y="1939186"/>
-            <a:ext cx="1542785" cy="1340257"/>
-          </a:xfrm>
-          <a:prstGeom prst="rect">
-            <a:avLst/>
-          </a:prstGeom>
-        </p:spPr>
-      </p:pic>
-      <p:cxnSp>
-        <p:nvCxnSpPr>
-          <p:cNvPr id="24" name="Straight Arrow Connector 23">
-            <a:extLst>
-              <a:ext uri="{FF2B5EF4-FFF2-40B4-BE49-F238E27FC236}">
-                <a16:creationId xmlns:a16="http://schemas.microsoft.com/office/drawing/2014/main" id="{DDA6C7D6-9BC6-2B41-8D90-25253A85156E}"/>
-              </a:ext>
-            </a:extLst>
-          </p:cNvPr>
-          <p:cNvCxnSpPr>
-            <a:cxnSpLocks/>
-          </p:cNvCxnSpPr>
-          <p:nvPr/>
-        </p:nvCxnSpPr>
-        <p:spPr>
-          <a:xfrm flipV="1">
-            <a:off x="4448488" y="2105777"/>
-            <a:ext cx="795024" cy="236565"/>
-          </a:xfrm>
-          <a:prstGeom prst="straightConnector1">
-            <a:avLst/>
-          </a:prstGeom>
-          <a:ln w="28575">
-            <a:headEnd type="triangle" w="med" len="med"/>
-            <a:tailEnd type="triangle" w="med" len="med"/>
-          </a:ln>
-        </p:spPr>
-        <p:style>
-          <a:lnRef idx="1">
-            <a:schemeClr val="accent1"/>
-          </a:lnRef>
-          <a:fillRef idx="0">
-            <a:schemeClr val="accent1"/>
-          </a:fillRef>
-          <a:effectRef idx="0">
-            <a:schemeClr val="accent1"/>
-          </a:effectRef>
-          <a:fontRef idx="minor">
-            <a:schemeClr val="tx1"/>
-          </a:fontRef>
-        </p:style>
-      </p:cxnSp>
       <p:sp>
         <p:nvSpPr>
           <p:cNvPr id="27" name="Rectangle 26">
@@ -4238,7 +4050,7 @@
         </p:nvSpPr>
         <p:spPr>
           <a:xfrm>
-            <a:off x="5729126" y="3699997"/>
+            <a:off x="4631728" y="3653698"/>
             <a:ext cx="2535621" cy="1587061"/>
           </a:xfrm>
           <a:prstGeom prst="rect">
@@ -4293,7 +4105,7 @@
         </p:blipFill>
         <p:spPr>
           <a:xfrm>
-            <a:off x="5919625" y="3760004"/>
+            <a:off x="4822227" y="3713705"/>
             <a:ext cx="306239" cy="240862"/>
           </a:xfrm>
           <a:prstGeom prst="rect">
@@ -4315,7 +4127,7 @@
         </p:nvSpPr>
         <p:spPr>
           <a:xfrm>
-            <a:off x="6155730" y="3695769"/>
+            <a:off x="5058332" y="3649470"/>
             <a:ext cx="1887923" cy="369332"/>
           </a:xfrm>
           <a:prstGeom prst="rect">
@@ -4350,7 +4162,7 @@
         </p:nvSpPr>
         <p:spPr>
           <a:xfrm>
-            <a:off x="5940269" y="4165307"/>
+            <a:off x="4842871" y="4119008"/>
             <a:ext cx="2103384" cy="978931"/>
           </a:xfrm>
           <a:prstGeom prst="rect">
@@ -4397,8 +4209,8 @@
         </p:nvSpPr>
         <p:spPr>
           <a:xfrm>
-            <a:off x="6751909" y="4470106"/>
-            <a:ext cx="674629" cy="369332"/>
+            <a:off x="5335061" y="4423807"/>
+            <a:ext cx="1200674" cy="369332"/>
           </a:xfrm>
           <a:prstGeom prst="rect">
             <a:avLst/>
@@ -4413,53 +4225,11 @@
           <a:p>
             <a:r>
               <a:rPr lang="en-US" dirty="0"/>
-              <a:t>API</a:t>
-            </a:r>
-          </a:p>
-        </p:txBody>
-      </p:sp>
-      <p:cxnSp>
-        <p:nvCxnSpPr>
-          <p:cNvPr id="32" name="Straight Arrow Connector 31">
-            <a:extLst>
-              <a:ext uri="{FF2B5EF4-FFF2-40B4-BE49-F238E27FC236}">
-                <a16:creationId xmlns:a16="http://schemas.microsoft.com/office/drawing/2014/main" id="{B6BC8A34-762B-D248-A14A-AD962279184D}"/>
-              </a:ext>
-            </a:extLst>
-          </p:cNvPr>
-          <p:cNvCxnSpPr>
-            <a:cxnSpLocks/>
-          </p:cNvCxnSpPr>
-          <p:nvPr/>
-        </p:nvCxnSpPr>
-        <p:spPr>
-          <a:xfrm flipH="1" flipV="1">
-            <a:off x="6948491" y="2921078"/>
-            <a:ext cx="1" cy="762618"/>
-          </a:xfrm>
-          <a:prstGeom prst="straightConnector1">
-            <a:avLst/>
-          </a:prstGeom>
-          <a:ln w="28575">
-            <a:headEnd type="triangle" w="med" len="med"/>
-            <a:tailEnd type="triangle" w="med" len="med"/>
-          </a:ln>
-        </p:spPr>
-        <p:style>
-          <a:lnRef idx="1">
-            <a:schemeClr val="accent1"/>
-          </a:lnRef>
-          <a:fillRef idx="0">
-            <a:schemeClr val="accent1"/>
-          </a:fillRef>
-          <a:effectRef idx="0">
-            <a:schemeClr val="accent1"/>
-          </a:effectRef>
-          <a:fontRef idx="minor">
-            <a:schemeClr val="tx1"/>
-          </a:fontRef>
-        </p:style>
-      </p:cxnSp>
+              <a:t>API Server</a:t>
+            </a:r>
+          </a:p>
+        </p:txBody>
+      </p:sp>
       <p:pic>
         <p:nvPicPr>
           <p:cNvPr id="33" name="Picture 32">
@@ -4475,14 +4245,14 @@
           <p:nvPr/>
         </p:nvPicPr>
         <p:blipFill>
-          <a:blip r:embed="rId6"/>
+          <a:blip r:embed="rId4"/>
           <a:stretch>
             <a:fillRect/>
           </a:stretch>
         </p:blipFill>
         <p:spPr>
           <a:xfrm>
-            <a:off x="9661295" y="2331650"/>
+            <a:off x="8672747" y="3494674"/>
             <a:ext cx="914400" cy="1016000"/>
           </a:xfrm>
           <a:prstGeom prst="rect">
@@ -4504,8 +4274,8 @@
         </p:nvSpPr>
         <p:spPr>
           <a:xfrm>
-            <a:off x="9113457" y="1074057"/>
-            <a:ext cx="2340847" cy="5190322"/>
+            <a:off x="8016059" y="3405849"/>
+            <a:ext cx="3821154" cy="3029673"/>
           </a:xfrm>
           <a:prstGeom prst="rect">
             <a:avLst/>
@@ -4551,7 +4321,7 @@
         </p:nvSpPr>
         <p:spPr>
           <a:xfrm>
-            <a:off x="10118495" y="704725"/>
+            <a:off x="9627133" y="3039474"/>
             <a:ext cx="830318" cy="369332"/>
           </a:xfrm>
           <a:prstGeom prst="rect">
@@ -4586,8 +4356,8 @@
         </p:nvSpPr>
         <p:spPr>
           <a:xfrm>
-            <a:off x="9895560" y="1922757"/>
-            <a:ext cx="1360269" cy="369332"/>
+            <a:off x="9545268" y="3831474"/>
+            <a:ext cx="1832645" cy="369332"/>
           </a:xfrm>
           <a:prstGeom prst="rect">
             <a:avLst/>
@@ -4602,73 +4372,31 @@
           <a:p>
             <a:r>
               <a:rPr lang="en-US" dirty="0"/>
-              <a:t>RDS</a:t>
+              <a:t>RDS – Postgres</a:t>
             </a:r>
           </a:p>
         </p:txBody>
       </p:sp>
       <p:cxnSp>
         <p:nvCxnSpPr>
-          <p:cNvPr id="42" name="Straight Arrow Connector 41">
-            <a:extLst>
-              <a:ext uri="{FF2B5EF4-FFF2-40B4-BE49-F238E27FC236}">
-                <a16:creationId xmlns:a16="http://schemas.microsoft.com/office/drawing/2014/main" id="{F2534924-6F88-7748-9F70-E8BCBA431B5E}"/>
+          <p:cNvPr id="45" name="Straight Arrow Connector 44">
+            <a:extLst>
+              <a:ext uri="{FF2B5EF4-FFF2-40B4-BE49-F238E27FC236}">
+                <a16:creationId xmlns:a16="http://schemas.microsoft.com/office/drawing/2014/main" id="{C8A30FB8-83BF-0840-B709-62C9C8A560A3}"/>
               </a:ext>
             </a:extLst>
           </p:cNvPr>
           <p:cNvCxnSpPr>
             <a:cxnSpLocks/>
-            <a:stCxn id="1026" idx="3"/>
+            <a:stCxn id="18" idx="3"/>
+            <a:endCxn id="6" idx="1"/>
           </p:cNvCxnSpPr>
           <p:nvPr/>
         </p:nvCxnSpPr>
         <p:spPr>
           <a:xfrm>
-            <a:off x="1574902" y="3080031"/>
-            <a:ext cx="1330801" cy="1208190"/>
-          </a:xfrm>
-          <a:prstGeom prst="straightConnector1">
-            <a:avLst/>
-          </a:prstGeom>
-          <a:ln w="28575">
-            <a:headEnd type="triangle" w="med" len="med"/>
-            <a:tailEnd type="triangle" w="med" len="med"/>
-          </a:ln>
-        </p:spPr>
-        <p:style>
-          <a:lnRef idx="1">
-            <a:schemeClr val="accent1"/>
-          </a:lnRef>
-          <a:fillRef idx="0">
-            <a:schemeClr val="accent1"/>
-          </a:fillRef>
-          <a:effectRef idx="0">
-            <a:schemeClr val="accent1"/>
-          </a:effectRef>
-          <a:fontRef idx="minor">
-            <a:schemeClr val="tx1"/>
-          </a:fontRef>
-        </p:style>
-      </p:cxnSp>
-      <p:cxnSp>
-        <p:nvCxnSpPr>
-          <p:cNvPr id="45" name="Straight Arrow Connector 44">
-            <a:extLst>
-              <a:ext uri="{FF2B5EF4-FFF2-40B4-BE49-F238E27FC236}">
-                <a16:creationId xmlns:a16="http://schemas.microsoft.com/office/drawing/2014/main" id="{C8A30FB8-83BF-0840-B709-62C9C8A560A3}"/>
-              </a:ext>
-            </a:extLst>
-          </p:cNvPr>
-          <p:cNvCxnSpPr>
-            <a:cxnSpLocks/>
-            <a:endCxn id="30" idx="1"/>
-          </p:cNvCxnSpPr>
-          <p:nvPr/>
-        </p:nvCxnSpPr>
-        <p:spPr>
-          <a:xfrm>
-            <a:off x="3837019" y="4288221"/>
-            <a:ext cx="2103250" cy="366552"/>
+            <a:off x="3520924" y="2061963"/>
+            <a:ext cx="1247930" cy="69383"/>
           </a:xfrm>
           <a:prstGeom prst="straightConnector1">
             <a:avLst/>
@@ -4705,13 +4433,14 @@
           <p:cNvCxnSpPr>
             <a:cxnSpLocks/>
             <a:stCxn id="27" idx="3"/>
+            <a:endCxn id="33" idx="1"/>
           </p:cNvCxnSpPr>
           <p:nvPr/>
         </p:nvCxnSpPr>
         <p:spPr>
           <a:xfrm flipV="1">
-            <a:off x="8264747" y="2931450"/>
-            <a:ext cx="1401417" cy="1562078"/>
+            <a:off x="7167349" y="4002674"/>
+            <a:ext cx="1505398" cy="444555"/>
           </a:xfrm>
           <a:prstGeom prst="straightConnector1">
             <a:avLst/>
@@ -4736,136 +4465,259 @@
           </a:fontRef>
         </p:style>
       </p:cxnSp>
-      <p:sp>
-        <p:nvSpPr>
-          <p:cNvPr id="53" name="TextBox 52">
-            <a:extLst>
-              <a:ext uri="{FF2B5EF4-FFF2-40B4-BE49-F238E27FC236}">
-                <a16:creationId xmlns:a16="http://schemas.microsoft.com/office/drawing/2014/main" id="{225DE6ED-1DBA-A941-B2CA-E3E9A09B4E43}"/>
-              </a:ext>
-            </a:extLst>
-          </p:cNvPr>
-          <p:cNvSpPr txBox="1"/>
+      <p:grpSp>
+        <p:nvGrpSpPr>
+          <p:cNvPr id="80" name="Group 79">
+            <a:extLst>
+              <a:ext uri="{FF2B5EF4-FFF2-40B4-BE49-F238E27FC236}">
+                <a16:creationId xmlns:a16="http://schemas.microsoft.com/office/drawing/2014/main" id="{21B29FBF-A076-0E45-AE1A-C7867971ADB3}"/>
+              </a:ext>
+            </a:extLst>
+          </p:cNvPr>
+          <p:cNvGrpSpPr/>
           <p:nvPr/>
-        </p:nvSpPr>
-        <p:spPr>
-          <a:xfrm>
-            <a:off x="2805474" y="4792178"/>
-            <a:ext cx="1376857" cy="646331"/>
-          </a:xfrm>
-          <a:prstGeom prst="rect">
-            <a:avLst/>
-          </a:prstGeom>
-          <a:noFill/>
-        </p:spPr>
-        <p:txBody>
-          <a:bodyPr wrap="square" rtlCol="0">
-            <a:spAutoFit/>
-          </a:bodyPr>
-          <a:lstStyle/>
-          <a:p>
-            <a:r>
-              <a:rPr lang="en-US" dirty="0"/>
-              <a:t>Mobile App Front End</a:t>
-            </a:r>
-          </a:p>
-        </p:txBody>
-      </p:sp>
-      <p:pic>
-        <p:nvPicPr>
-          <p:cNvPr id="2" name="Picture 1">
-            <a:extLst>
-              <a:ext uri="{FF2B5EF4-FFF2-40B4-BE49-F238E27FC236}">
-                <a16:creationId xmlns:a16="http://schemas.microsoft.com/office/drawing/2014/main" id="{5B555087-5247-E24C-93A0-31A93D52980F}"/>
-              </a:ext>
-            </a:extLst>
-          </p:cNvPr>
-          <p:cNvPicPr>
-            <a:picLocks noChangeAspect="1"/>
-          </p:cNvPicPr>
+        </p:nvGrpSpPr>
+        <p:grpSpPr>
+          <a:xfrm>
+            <a:off x="1978139" y="1391834"/>
+            <a:ext cx="1571955" cy="1938519"/>
+            <a:chOff x="2313934" y="1377016"/>
+            <a:chExt cx="1571955" cy="1938519"/>
+          </a:xfrm>
+        </p:grpSpPr>
+        <p:grpSp>
+          <p:nvGrpSpPr>
+            <p:cNvPr id="76" name="Group 75">
+              <a:extLst>
+                <a:ext uri="{FF2B5EF4-FFF2-40B4-BE49-F238E27FC236}">
+                  <a16:creationId xmlns:a16="http://schemas.microsoft.com/office/drawing/2014/main" id="{7036B40D-0C5E-134C-A487-BE3928B52F8F}"/>
+                </a:ext>
+              </a:extLst>
+            </p:cNvPr>
+            <p:cNvGrpSpPr/>
+            <p:nvPr/>
+          </p:nvGrpSpPr>
+          <p:grpSpPr>
+            <a:xfrm>
+              <a:off x="2313934" y="1377016"/>
+              <a:ext cx="1571955" cy="1938519"/>
+              <a:chOff x="1554435" y="2661582"/>
+              <a:chExt cx="1571955" cy="1938519"/>
+            </a:xfrm>
+          </p:grpSpPr>
+          <p:pic>
+            <p:nvPicPr>
+              <p:cNvPr id="18" name="Picture 17">
+                <a:extLst>
+                  <a:ext uri="{FF2B5EF4-FFF2-40B4-BE49-F238E27FC236}">
+                    <a16:creationId xmlns:a16="http://schemas.microsoft.com/office/drawing/2014/main" id="{2A1E8CF8-2C5A-1648-B580-68E1B6088245}"/>
+                  </a:ext>
+                </a:extLst>
+              </p:cNvPr>
+              <p:cNvPicPr>
+                <a:picLocks noChangeAspect="1"/>
+              </p:cNvPicPr>
+              <p:nvPr/>
+            </p:nvPicPr>
+            <p:blipFill>
+              <a:blip r:embed="rId5"/>
+              <a:stretch>
+                <a:fillRect/>
+              </a:stretch>
+            </p:blipFill>
+            <p:spPr>
+              <a:xfrm>
+                <a:off x="1554435" y="2661582"/>
+                <a:ext cx="1542785" cy="1340257"/>
+              </a:xfrm>
+              <a:prstGeom prst="rect">
+                <a:avLst/>
+              </a:prstGeom>
+            </p:spPr>
+          </p:pic>
+          <p:sp>
+            <p:nvSpPr>
+              <p:cNvPr id="35" name="TextBox 34">
+                <a:extLst>
+                  <a:ext uri="{FF2B5EF4-FFF2-40B4-BE49-F238E27FC236}">
+                    <a16:creationId xmlns:a16="http://schemas.microsoft.com/office/drawing/2014/main" id="{5449AD17-B477-994F-B9F8-577CCEB2FC50}"/>
+                  </a:ext>
+                </a:extLst>
+              </p:cNvPr>
+              <p:cNvSpPr txBox="1"/>
+              <p:nvPr/>
+            </p:nvSpPr>
+            <p:spPr>
+              <a:xfrm>
+                <a:off x="1749533" y="3953770"/>
+                <a:ext cx="1376857" cy="646331"/>
+              </a:xfrm>
+              <a:prstGeom prst="rect">
+                <a:avLst/>
+              </a:prstGeom>
+              <a:noFill/>
+            </p:spPr>
+            <p:txBody>
+              <a:bodyPr wrap="square" rtlCol="0">
+                <a:spAutoFit/>
+              </a:bodyPr>
+              <a:lstStyle/>
+              <a:p>
+                <a:r>
+                  <a:rPr lang="en-US" dirty="0"/>
+                  <a:t>Web App Front End</a:t>
+                </a:r>
+              </a:p>
+            </p:txBody>
+          </p:sp>
+        </p:grpSp>
+        <p:pic>
+          <p:nvPicPr>
+            <p:cNvPr id="2" name="Picture 1">
+              <a:extLst>
+                <a:ext uri="{FF2B5EF4-FFF2-40B4-BE49-F238E27FC236}">
+                  <a16:creationId xmlns:a16="http://schemas.microsoft.com/office/drawing/2014/main" id="{5B555087-5247-E24C-93A0-31A93D52980F}"/>
+                </a:ext>
+              </a:extLst>
+            </p:cNvPr>
+            <p:cNvPicPr>
+              <a:picLocks noChangeAspect="1"/>
+            </p:cNvPicPr>
+            <p:nvPr/>
+          </p:nvPicPr>
+          <p:blipFill>
+            <a:blip r:embed="rId6"/>
+            <a:stretch>
+              <a:fillRect/>
+            </a:stretch>
+          </p:blipFill>
+          <p:spPr>
+            <a:xfrm>
+              <a:off x="2672342" y="1674019"/>
+              <a:ext cx="226091" cy="273918"/>
+            </a:xfrm>
+            <a:prstGeom prst="rect">
+              <a:avLst/>
+            </a:prstGeom>
+          </p:spPr>
+        </p:pic>
+      </p:grpSp>
+      <p:grpSp>
+        <p:nvGrpSpPr>
+          <p:cNvPr id="77" name="Group 76">
+            <a:extLst>
+              <a:ext uri="{FF2B5EF4-FFF2-40B4-BE49-F238E27FC236}">
+                <a16:creationId xmlns:a16="http://schemas.microsoft.com/office/drawing/2014/main" id="{90FD8E12-1275-5E42-922F-18452F1E762A}"/>
+              </a:ext>
+            </a:extLst>
+          </p:cNvPr>
+          <p:cNvGrpSpPr/>
           <p:nvPr/>
-        </p:nvPicPr>
-        <p:blipFill>
-          <a:blip r:embed="rId7"/>
-          <a:stretch>
-            <a:fillRect/>
-          </a:stretch>
-        </p:blipFill>
-        <p:spPr>
-          <a:xfrm>
-            <a:off x="3542386" y="2256178"/>
-            <a:ext cx="226091" cy="273918"/>
-          </a:xfrm>
-          <a:prstGeom prst="rect">
-            <a:avLst/>
-          </a:prstGeom>
-        </p:spPr>
-      </p:pic>
-      <p:pic>
-        <p:nvPicPr>
-          <p:cNvPr id="34" name="Picture 33">
-            <a:extLst>
-              <a:ext uri="{FF2B5EF4-FFF2-40B4-BE49-F238E27FC236}">
-                <a16:creationId xmlns:a16="http://schemas.microsoft.com/office/drawing/2014/main" id="{ACC867EE-8B48-6A4D-A1CE-7C855B37F575}"/>
-              </a:ext>
-            </a:extLst>
-          </p:cNvPr>
-          <p:cNvPicPr>
-            <a:picLocks noChangeAspect="1"/>
-          </p:cNvPicPr>
-          <p:nvPr/>
-        </p:nvPicPr>
-        <p:blipFill>
-          <a:blip r:embed="rId7"/>
-          <a:stretch>
-            <a:fillRect/>
-          </a:stretch>
-        </p:blipFill>
-        <p:spPr>
-          <a:xfrm>
-            <a:off x="3267812" y="4151262"/>
-            <a:ext cx="226091" cy="273918"/>
-          </a:xfrm>
-          <a:prstGeom prst="rect">
-            <a:avLst/>
-          </a:prstGeom>
-        </p:spPr>
-      </p:pic>
-      <p:sp>
-        <p:nvSpPr>
-          <p:cNvPr id="35" name="TextBox 34">
-            <a:extLst>
-              <a:ext uri="{FF2B5EF4-FFF2-40B4-BE49-F238E27FC236}">
-                <a16:creationId xmlns:a16="http://schemas.microsoft.com/office/drawing/2014/main" id="{5449AD17-B477-994F-B9F8-577CCEB2FC50}"/>
-              </a:ext>
-            </a:extLst>
-          </p:cNvPr>
-          <p:cNvSpPr txBox="1"/>
-          <p:nvPr/>
-        </p:nvSpPr>
-        <p:spPr>
-          <a:xfrm>
-            <a:off x="3087738" y="1313864"/>
-            <a:ext cx="1376857" cy="646331"/>
-          </a:xfrm>
-          <a:prstGeom prst="rect">
-            <a:avLst/>
-          </a:prstGeom>
-          <a:noFill/>
-        </p:spPr>
-        <p:txBody>
-          <a:bodyPr wrap="square" rtlCol="0">
-            <a:spAutoFit/>
-          </a:bodyPr>
-          <a:lstStyle/>
-          <a:p>
-            <a:r>
-              <a:rPr lang="en-US" dirty="0"/>
-              <a:t>Web App Front End</a:t>
-            </a:r>
-          </a:p>
-        </p:txBody>
-      </p:sp>
+        </p:nvGrpSpPr>
+        <p:grpSpPr>
+          <a:xfrm>
+            <a:off x="2007520" y="3554736"/>
+            <a:ext cx="1719621" cy="1972708"/>
+            <a:chOff x="1635119" y="3825110"/>
+            <a:chExt cx="1719621" cy="1972708"/>
+          </a:xfrm>
+        </p:grpSpPr>
+        <p:pic>
+          <p:nvPicPr>
+            <p:cNvPr id="16" name="Picture 15">
+              <a:extLst>
+                <a:ext uri="{FF2B5EF4-FFF2-40B4-BE49-F238E27FC236}">
+                  <a16:creationId xmlns:a16="http://schemas.microsoft.com/office/drawing/2014/main" id="{51EC2F49-2440-5F44-9240-ABEB2152B9FB}"/>
+                </a:ext>
+              </a:extLst>
+            </p:cNvPr>
+            <p:cNvPicPr>
+              <a:picLocks noChangeAspect="1"/>
+            </p:cNvPicPr>
+            <p:nvPr/>
+          </p:nvPicPr>
+          <p:blipFill>
+            <a:blip r:embed="rId7"/>
+            <a:stretch>
+              <a:fillRect/>
+            </a:stretch>
+          </p:blipFill>
+          <p:spPr>
+            <a:xfrm>
+              <a:off x="1932593" y="3825110"/>
+              <a:ext cx="666303" cy="923409"/>
+            </a:xfrm>
+            <a:prstGeom prst="rect">
+              <a:avLst/>
+            </a:prstGeom>
+          </p:spPr>
+        </p:pic>
+        <p:sp>
+          <p:nvSpPr>
+            <p:cNvPr id="53" name="TextBox 52">
+              <a:extLst>
+                <a:ext uri="{FF2B5EF4-FFF2-40B4-BE49-F238E27FC236}">
+                  <a16:creationId xmlns:a16="http://schemas.microsoft.com/office/drawing/2014/main" id="{225DE6ED-1DBA-A941-B2CA-E3E9A09B4E43}"/>
+                </a:ext>
+              </a:extLst>
+            </p:cNvPr>
+            <p:cNvSpPr txBox="1"/>
+            <p:nvPr/>
+          </p:nvSpPr>
+          <p:spPr>
+            <a:xfrm>
+              <a:off x="1635119" y="4874488"/>
+              <a:ext cx="1719621" cy="923330"/>
+            </a:xfrm>
+            <a:prstGeom prst="rect">
+              <a:avLst/>
+            </a:prstGeom>
+            <a:noFill/>
+          </p:spPr>
+          <p:txBody>
+            <a:bodyPr wrap="square" rtlCol="0">
+              <a:spAutoFit/>
+            </a:bodyPr>
+            <a:lstStyle/>
+            <a:p>
+              <a:r>
+                <a:rPr lang="en-US" dirty="0"/>
+                <a:t>Mobile App Front End (Native or web)</a:t>
+              </a:r>
+            </a:p>
+          </p:txBody>
+        </p:sp>
+        <p:pic>
+          <p:nvPicPr>
+            <p:cNvPr id="34" name="Picture 33">
+              <a:extLst>
+                <a:ext uri="{FF2B5EF4-FFF2-40B4-BE49-F238E27FC236}">
+                  <a16:creationId xmlns:a16="http://schemas.microsoft.com/office/drawing/2014/main" id="{ACC867EE-8B48-6A4D-A1CE-7C855B37F575}"/>
+                </a:ext>
+              </a:extLst>
+            </p:cNvPr>
+            <p:cNvPicPr>
+              <a:picLocks noChangeAspect="1"/>
+            </p:cNvPicPr>
+            <p:nvPr/>
+          </p:nvPicPr>
+          <p:blipFill>
+            <a:blip r:embed="rId6"/>
+            <a:stretch>
+              <a:fillRect/>
+            </a:stretch>
+          </p:blipFill>
+          <p:spPr>
+            <a:xfrm>
+              <a:off x="2174167" y="4115323"/>
+              <a:ext cx="226091" cy="273918"/>
+            </a:xfrm>
+            <a:prstGeom prst="rect">
+              <a:avLst/>
+            </a:prstGeom>
+          </p:spPr>
+        </p:pic>
+      </p:grpSp>
       <p:pic>
         <p:nvPicPr>
           <p:cNvPr id="22" name="Picture 21">
@@ -4901,7 +4753,7 @@
         </p:blipFill>
         <p:spPr>
           <a:xfrm>
-            <a:off x="9877103" y="5097193"/>
+            <a:off x="8800037" y="5377144"/>
             <a:ext cx="659819" cy="686750"/>
           </a:xfrm>
           <a:prstGeom prst="rect">
@@ -4923,7 +4775,7 @@
         </p:nvSpPr>
         <p:spPr>
           <a:xfrm>
-            <a:off x="9759700" y="5824293"/>
+            <a:off x="8643450" y="6060937"/>
             <a:ext cx="1108573" cy="369332"/>
           </a:xfrm>
           <a:prstGeom prst="rect">
@@ -4955,13 +4807,14 @@
           </p:cNvPr>
           <p:cNvCxnSpPr>
             <a:cxnSpLocks/>
+            <a:stCxn id="22" idx="0"/>
           </p:cNvCxnSpPr>
           <p:nvPr/>
         </p:nvCxnSpPr>
         <p:spPr>
-          <a:xfrm flipH="1" flipV="1">
-            <a:off x="9887258" y="3387212"/>
-            <a:ext cx="149503" cy="1639227"/>
+          <a:xfrm flipV="1">
+            <a:off x="9129947" y="4713494"/>
+            <a:ext cx="0" cy="663650"/>
           </a:xfrm>
           <a:prstGeom prst="straightConnector1">
             <a:avLst/>
@@ -5008,7 +4861,7 @@
         </p:blipFill>
         <p:spPr>
           <a:xfrm>
-            <a:off x="10435091" y="3418233"/>
+            <a:off x="10594926" y="5090391"/>
             <a:ext cx="952500" cy="1257300"/>
           </a:xfrm>
           <a:prstGeom prst="rect">
@@ -5027,21 +4880,20 @@
           </p:cNvPr>
           <p:cNvCxnSpPr>
             <a:cxnSpLocks/>
-            <a:endCxn id="37" idx="2"/>
           </p:cNvCxnSpPr>
           <p:nvPr/>
         </p:nvCxnSpPr>
         <p:spPr>
           <a:xfrm flipV="1">
-            <a:off x="10482155" y="4675533"/>
-            <a:ext cx="429186" cy="369332"/>
+            <a:off x="9518622" y="5698450"/>
+            <a:ext cx="1032407" cy="4760"/>
           </a:xfrm>
           <a:prstGeom prst="straightConnector1">
             <a:avLst/>
           </a:prstGeom>
           <a:ln w="28575">
             <a:headEnd type="triangle" w="med" len="med"/>
-            <a:tailEnd type="triangle" w="med" len="med"/>
+            <a:tailEnd type="none" w="med" len="med"/>
           </a:ln>
         </p:spPr>
         <p:style>
@@ -5069,17 +4921,19 @@
             </a:extLst>
           </p:cNvPr>
           <p:cNvCxnSpPr>
-            <a:endCxn id="53" idx="2"/>
+            <a:cxnSpLocks/>
           </p:cNvCxnSpPr>
           <p:nvPr/>
         </p:nvCxnSpPr>
         <p:spPr>
           <a:xfrm rot="10800000">
-            <a:off x="3493904" y="5438510"/>
-            <a:ext cx="6265797" cy="306079"/>
-          </a:xfrm>
-          <a:prstGeom prst="bentConnector2">
-            <a:avLst/>
+            <a:off x="867008" y="3628714"/>
+            <a:ext cx="7706605" cy="2201529"/>
+          </a:xfrm>
+          <a:prstGeom prst="bentConnector3">
+            <a:avLst>
+              <a:gd name="adj1" fmla="val 99864"/>
+            </a:avLst>
           </a:prstGeom>
           <a:ln w="19050">
             <a:tailEnd type="triangle"/>
@@ -5114,7 +4968,7 @@
         </p:nvSpPr>
         <p:spPr>
           <a:xfrm>
-            <a:off x="6165420" y="5783943"/>
+            <a:off x="3834583" y="5930450"/>
             <a:ext cx="1868541" cy="369332"/>
           </a:xfrm>
           <a:prstGeom prst="rect">
@@ -5135,6 +4989,287 @@
           </a:p>
         </p:txBody>
       </p:sp>
+      <p:sp>
+        <p:nvSpPr>
+          <p:cNvPr id="61" name="Rectangle 60">
+            <a:extLst>
+              <a:ext uri="{FF2B5EF4-FFF2-40B4-BE49-F238E27FC236}">
+                <a16:creationId xmlns:a16="http://schemas.microsoft.com/office/drawing/2014/main" id="{296C0CD9-EF01-C94B-B72E-D7AD6CBDC9B5}"/>
+              </a:ext>
+            </a:extLst>
+          </p:cNvPr>
+          <p:cNvSpPr/>
+          <p:nvPr/>
+        </p:nvSpPr>
+        <p:spPr>
+          <a:xfrm>
+            <a:off x="8437461" y="832047"/>
+            <a:ext cx="2103384" cy="978931"/>
+          </a:xfrm>
+          <a:prstGeom prst="rect">
+            <a:avLst/>
+          </a:prstGeom>
+          <a:noFill/>
+        </p:spPr>
+        <p:style>
+          <a:lnRef idx="2">
+            <a:schemeClr val="accent1">
+              <a:shade val="50000"/>
+            </a:schemeClr>
+          </a:lnRef>
+          <a:fillRef idx="1">
+            <a:schemeClr val="accent1"/>
+          </a:fillRef>
+          <a:effectRef idx="0">
+            <a:schemeClr val="accent1"/>
+          </a:effectRef>
+          <a:fontRef idx="minor">
+            <a:schemeClr val="lt1"/>
+          </a:fontRef>
+        </p:style>
+        <p:txBody>
+          <a:bodyPr rtlCol="0" anchor="ctr"/>
+          <a:lstStyle/>
+          <a:p>
+            <a:pPr algn="ctr"/>
+            <a:endParaRPr lang="en-US"/>
+          </a:p>
+        </p:txBody>
+      </p:sp>
+      <p:sp>
+        <p:nvSpPr>
+          <p:cNvPr id="63" name="TextBox 62">
+            <a:extLst>
+              <a:ext uri="{FF2B5EF4-FFF2-40B4-BE49-F238E27FC236}">
+                <a16:creationId xmlns:a16="http://schemas.microsoft.com/office/drawing/2014/main" id="{E0AFB282-40CB-7645-8DD6-6812EBFFEC5C}"/>
+              </a:ext>
+            </a:extLst>
+          </p:cNvPr>
+          <p:cNvSpPr txBox="1"/>
+          <p:nvPr/>
+        </p:nvSpPr>
+        <p:spPr>
+          <a:xfrm>
+            <a:off x="8511812" y="1136477"/>
+            <a:ext cx="2083114" cy="369332"/>
+          </a:xfrm>
+          <a:prstGeom prst="rect">
+            <a:avLst/>
+          </a:prstGeom>
+          <a:noFill/>
+        </p:spPr>
+        <p:txBody>
+          <a:bodyPr wrap="square" rtlCol="0">
+            <a:spAutoFit/>
+          </a:bodyPr>
+          <a:lstStyle/>
+          <a:p>
+            <a:r>
+              <a:rPr lang="en-US" dirty="0"/>
+              <a:t>External FHIR server</a:t>
+            </a:r>
+          </a:p>
+        </p:txBody>
+      </p:sp>
+      <p:cxnSp>
+        <p:nvCxnSpPr>
+          <p:cNvPr id="64" name="Straight Arrow Connector 63">
+            <a:extLst>
+              <a:ext uri="{FF2B5EF4-FFF2-40B4-BE49-F238E27FC236}">
+                <a16:creationId xmlns:a16="http://schemas.microsoft.com/office/drawing/2014/main" id="{57B0FC43-6123-A241-B612-FE6A5DD77C3C}"/>
+              </a:ext>
+            </a:extLst>
+          </p:cNvPr>
+          <p:cNvCxnSpPr>
+            <a:cxnSpLocks/>
+            <a:stCxn id="27" idx="3"/>
+          </p:cNvCxnSpPr>
+          <p:nvPr/>
+        </p:nvCxnSpPr>
+        <p:spPr>
+          <a:xfrm flipV="1">
+            <a:off x="7167349" y="1810978"/>
+            <a:ext cx="1270112" cy="2636251"/>
+          </a:xfrm>
+          <a:prstGeom prst="straightConnector1">
+            <a:avLst/>
+          </a:prstGeom>
+          <a:ln w="28575">
+            <a:headEnd type="triangle" w="med" len="med"/>
+            <a:tailEnd type="triangle" w="med" len="med"/>
+          </a:ln>
+        </p:spPr>
+        <p:style>
+          <a:lnRef idx="1">
+            <a:schemeClr val="accent1"/>
+          </a:lnRef>
+          <a:fillRef idx="0">
+            <a:schemeClr val="accent1"/>
+          </a:fillRef>
+          <a:effectRef idx="0">
+            <a:schemeClr val="accent1"/>
+          </a:effectRef>
+          <a:fontRef idx="minor">
+            <a:schemeClr val="tx1"/>
+          </a:fontRef>
+        </p:style>
+      </p:cxnSp>
+      <p:sp>
+        <p:nvSpPr>
+          <p:cNvPr id="67" name="TextBox 66">
+            <a:extLst>
+              <a:ext uri="{FF2B5EF4-FFF2-40B4-BE49-F238E27FC236}">
+                <a16:creationId xmlns:a16="http://schemas.microsoft.com/office/drawing/2014/main" id="{470065F0-42C8-8F4F-87B6-2601EAC26F70}"/>
+              </a:ext>
+            </a:extLst>
+          </p:cNvPr>
+          <p:cNvSpPr txBox="1"/>
+          <p:nvPr/>
+        </p:nvSpPr>
+        <p:spPr>
+          <a:xfrm>
+            <a:off x="8324903" y="1928477"/>
+            <a:ext cx="1782858" cy="261610"/>
+          </a:xfrm>
+          <a:prstGeom prst="rect">
+            <a:avLst/>
+          </a:prstGeom>
+          <a:noFill/>
+        </p:spPr>
+        <p:txBody>
+          <a:bodyPr wrap="square" rtlCol="0">
+            <a:spAutoFit/>
+          </a:bodyPr>
+          <a:lstStyle/>
+          <a:p>
+            <a:r>
+              <a:rPr lang="en-US" sz="1100" dirty="0"/>
+              <a:t>Gets Patient Information </a:t>
+            </a:r>
+          </a:p>
+        </p:txBody>
+      </p:sp>
+      <p:sp>
+        <p:nvSpPr>
+          <p:cNvPr id="68" name="TextBox 67">
+            <a:extLst>
+              <a:ext uri="{FF2B5EF4-FFF2-40B4-BE49-F238E27FC236}">
+                <a16:creationId xmlns:a16="http://schemas.microsoft.com/office/drawing/2014/main" id="{3EFC6377-0516-9641-8C62-8DE5A06A5D13}"/>
+              </a:ext>
+            </a:extLst>
+          </p:cNvPr>
+          <p:cNvSpPr txBox="1"/>
+          <p:nvPr/>
+        </p:nvSpPr>
+        <p:spPr>
+          <a:xfrm>
+            <a:off x="9772245" y="5240759"/>
+            <a:ext cx="985545" cy="430887"/>
+          </a:xfrm>
+          <a:prstGeom prst="rect">
+            <a:avLst/>
+          </a:prstGeom>
+          <a:noFill/>
+        </p:spPr>
+        <p:txBody>
+          <a:bodyPr wrap="square" rtlCol="0">
+            <a:spAutoFit/>
+          </a:bodyPr>
+          <a:lstStyle/>
+          <a:p>
+            <a:r>
+              <a:rPr lang="en-US" sz="1100" dirty="0"/>
+              <a:t>Scheduled trigger</a:t>
+            </a:r>
+          </a:p>
+        </p:txBody>
+      </p:sp>
+      <p:cxnSp>
+        <p:nvCxnSpPr>
+          <p:cNvPr id="92" name="Straight Arrow Connector 91">
+            <a:extLst>
+              <a:ext uri="{FF2B5EF4-FFF2-40B4-BE49-F238E27FC236}">
+                <a16:creationId xmlns:a16="http://schemas.microsoft.com/office/drawing/2014/main" id="{0B5E3739-3DA8-FD42-B100-3027E807D137}"/>
+              </a:ext>
+            </a:extLst>
+          </p:cNvPr>
+          <p:cNvCxnSpPr>
+            <a:cxnSpLocks/>
+            <a:endCxn id="30" idx="1"/>
+          </p:cNvCxnSpPr>
+          <p:nvPr/>
+        </p:nvCxnSpPr>
+        <p:spPr>
+          <a:xfrm>
+            <a:off x="3136141" y="4054774"/>
+            <a:ext cx="1706730" cy="553700"/>
+          </a:xfrm>
+          <a:prstGeom prst="straightConnector1">
+            <a:avLst/>
+          </a:prstGeom>
+          <a:ln w="28575">
+            <a:headEnd type="triangle" w="med" len="med"/>
+            <a:tailEnd type="triangle" w="med" len="med"/>
+          </a:ln>
+        </p:spPr>
+        <p:style>
+          <a:lnRef idx="1">
+            <a:schemeClr val="accent1"/>
+          </a:lnRef>
+          <a:fillRef idx="0">
+            <a:schemeClr val="accent1"/>
+          </a:fillRef>
+          <a:effectRef idx="0">
+            <a:schemeClr val="accent1"/>
+          </a:effectRef>
+          <a:fontRef idx="minor">
+            <a:schemeClr val="tx1"/>
+          </a:fontRef>
+        </p:style>
+      </p:cxnSp>
+      <p:cxnSp>
+        <p:nvCxnSpPr>
+          <p:cNvPr id="95" name="Straight Arrow Connector 94">
+            <a:extLst>
+              <a:ext uri="{FF2B5EF4-FFF2-40B4-BE49-F238E27FC236}">
+                <a16:creationId xmlns:a16="http://schemas.microsoft.com/office/drawing/2014/main" id="{E7D27376-0305-4A47-BFCC-A5BF48CFB3E1}"/>
+              </a:ext>
+            </a:extLst>
+          </p:cNvPr>
+          <p:cNvCxnSpPr>
+            <a:cxnSpLocks/>
+            <a:endCxn id="30" idx="1"/>
+          </p:cNvCxnSpPr>
+          <p:nvPr/>
+        </p:nvCxnSpPr>
+        <p:spPr>
+          <a:xfrm>
+            <a:off x="3612208" y="2151049"/>
+            <a:ext cx="1230663" cy="2457425"/>
+          </a:xfrm>
+          <a:prstGeom prst="straightConnector1">
+            <a:avLst/>
+          </a:prstGeom>
+          <a:ln w="28575">
+            <a:headEnd type="triangle" w="med" len="med"/>
+            <a:tailEnd type="triangle" w="med" len="med"/>
+          </a:ln>
+        </p:spPr>
+        <p:style>
+          <a:lnRef idx="1">
+            <a:schemeClr val="accent1"/>
+          </a:lnRef>
+          <a:fillRef idx="0">
+            <a:schemeClr val="accent1"/>
+          </a:fillRef>
+          <a:effectRef idx="0">
+            <a:schemeClr val="accent1"/>
+          </a:effectRef>
+          <a:fontRef idx="minor">
+            <a:schemeClr val="tx1"/>
+          </a:fontRef>
+        </p:style>
+      </p:cxnSp>
     </p:spTree>
     <p:extLst>
       <p:ext uri="{BB962C8B-B14F-4D97-AF65-F5344CB8AC3E}">

</xml_diff>